<commit_message>
Added more architecture diagrams
</commit_message>
<xml_diff>
--- a/docs/architecture/overview.pptx
+++ b/docs/architecture/overview.pptx
@@ -3829,55 +3829,6 @@
       </p:sp>
       <p:sp>
         <p:nvSpPr>
-          <p:cNvPr id="6" name="Rectangle 5">
-            <a:extLst>
-              <a:ext uri="{FF2B5EF4-FFF2-40B4-BE49-F238E27FC236}">
-                <a16:creationId xmlns:a16="http://schemas.microsoft.com/office/drawing/2014/main" id="{512F4E7D-EB97-4933-B5BA-1C205DBA8F87}"/>
-              </a:ext>
-            </a:extLst>
-          </p:cNvPr>
-          <p:cNvSpPr/>
-          <p:nvPr/>
-        </p:nvSpPr>
-        <p:spPr>
-          <a:xfrm>
-            <a:off x="4857646" y="1798438"/>
-            <a:ext cx="827690" cy="280496"/>
-          </a:xfrm>
-          <a:prstGeom prst="rect">
-            <a:avLst/>
-          </a:prstGeom>
-          <a:ln w="3175"/>
-        </p:spPr>
-        <p:style>
-          <a:lnRef idx="2">
-            <a:schemeClr val="dk1"/>
-          </a:lnRef>
-          <a:fillRef idx="1">
-            <a:schemeClr val="lt1"/>
-          </a:fillRef>
-          <a:effectRef idx="0">
-            <a:schemeClr val="dk1"/>
-          </a:effectRef>
-          <a:fontRef idx="minor">
-            <a:schemeClr val="dk1"/>
-          </a:fontRef>
-        </p:style>
-        <p:txBody>
-          <a:bodyPr rtlCol="0" anchor="ctr"/>
-          <a:lstStyle/>
-          <a:p>
-            <a:pPr algn="ctr"/>
-            <a:r>
-              <a:rPr lang="en-GB" sz="1000" dirty="0"/>
-              <a:t>IR</a:t>
-            </a:r>
-            <a:endParaRPr lang="en-US" sz="1000" dirty="0"/>
-          </a:p>
-        </p:txBody>
-      </p:sp>
-      <p:sp>
-        <p:nvSpPr>
           <p:cNvPr id="13" name="Rectangle 12">
             <a:extLst>
               <a:ext uri="{FF2B5EF4-FFF2-40B4-BE49-F238E27FC236}">
@@ -8456,55 +8407,6 @@
       </p:sp>
       <p:sp>
         <p:nvSpPr>
-          <p:cNvPr id="234" name="Rectangle 233">
-            <a:extLst>
-              <a:ext uri="{FF2B5EF4-FFF2-40B4-BE49-F238E27FC236}">
-                <a16:creationId xmlns:a16="http://schemas.microsoft.com/office/drawing/2014/main" id="{54C9DDA2-0FA5-4A32-986A-D67CAB72D747}"/>
-              </a:ext>
-            </a:extLst>
-          </p:cNvPr>
-          <p:cNvSpPr/>
-          <p:nvPr/>
-        </p:nvSpPr>
-        <p:spPr>
-          <a:xfrm>
-            <a:off x="5903530" y="1798438"/>
-            <a:ext cx="827690" cy="280566"/>
-          </a:xfrm>
-          <a:prstGeom prst="rect">
-            <a:avLst/>
-          </a:prstGeom>
-          <a:ln w="3175"/>
-        </p:spPr>
-        <p:style>
-          <a:lnRef idx="2">
-            <a:schemeClr val="dk1"/>
-          </a:lnRef>
-          <a:fillRef idx="1">
-            <a:schemeClr val="lt1"/>
-          </a:fillRef>
-          <a:effectRef idx="0">
-            <a:schemeClr val="dk1"/>
-          </a:effectRef>
-          <a:fontRef idx="minor">
-            <a:schemeClr val="dk1"/>
-          </a:fontRef>
-        </p:style>
-        <p:txBody>
-          <a:bodyPr rtlCol="0" anchor="ctr"/>
-          <a:lstStyle/>
-          <a:p>
-            <a:pPr algn="ctr"/>
-            <a:r>
-              <a:rPr lang="en-GB" sz="1000" dirty="0"/>
-              <a:t>STASHL</a:t>
-            </a:r>
-            <a:endParaRPr lang="en-US" sz="1000" dirty="0"/>
-          </a:p>
-        </p:txBody>
-      </p:sp>
-      <p:sp>
-        <p:nvSpPr>
           <p:cNvPr id="156" name="Rectangle 155">
             <a:extLst>
               <a:ext uri="{FF2B5EF4-FFF2-40B4-BE49-F238E27FC236}">
@@ -8547,55 +8449,6 @@
             <a:r>
               <a:rPr lang="en-GB" sz="1000" dirty="0"/>
               <a:t>STASHH</a:t>
-            </a:r>
-            <a:endParaRPr lang="en-US" sz="1000" dirty="0"/>
-          </a:p>
-        </p:txBody>
-      </p:sp>
-      <p:sp>
-        <p:nvSpPr>
-          <p:cNvPr id="9" name="Rectangle 8">
-            <a:extLst>
-              <a:ext uri="{FF2B5EF4-FFF2-40B4-BE49-F238E27FC236}">
-                <a16:creationId xmlns:a16="http://schemas.microsoft.com/office/drawing/2014/main" id="{A2F9B9C3-65DC-445D-BB11-9BA115F9B13F}"/>
-              </a:ext>
-            </a:extLst>
-          </p:cNvPr>
-          <p:cNvSpPr/>
-          <p:nvPr/>
-        </p:nvSpPr>
-        <p:spPr>
-          <a:xfrm>
-            <a:off x="3811762" y="1798438"/>
-            <a:ext cx="827690" cy="283443"/>
-          </a:xfrm>
-          <a:prstGeom prst="rect">
-            <a:avLst/>
-          </a:prstGeom>
-          <a:ln w="3175"/>
-        </p:spPr>
-        <p:style>
-          <a:lnRef idx="2">
-            <a:schemeClr val="dk1"/>
-          </a:lnRef>
-          <a:fillRef idx="1">
-            <a:schemeClr val="lt1"/>
-          </a:fillRef>
-          <a:effectRef idx="0">
-            <a:schemeClr val="dk1"/>
-          </a:effectRef>
-          <a:fontRef idx="minor">
-            <a:schemeClr val="dk1"/>
-          </a:fontRef>
-        </p:style>
-        <p:txBody>
-          <a:bodyPr rtlCol="0" anchor="ctr"/>
-          <a:lstStyle/>
-          <a:p>
-            <a:pPr algn="ctr"/>
-            <a:r>
-              <a:rPr lang="en-GB" sz="1000" dirty="0"/>
-              <a:t>MBR</a:t>
             </a:r>
             <a:endParaRPr lang="en-US" sz="1000" dirty="0"/>
           </a:p>
@@ -9618,7 +9471,7 @@
         </p:nvSpPr>
         <p:spPr>
           <a:xfrm>
-            <a:off x="4235809" y="2082232"/>
+            <a:off x="4059369" y="2078321"/>
             <a:ext cx="316866" cy="548831"/>
           </a:xfrm>
           <a:prstGeom prst="upDownArrow">
@@ -9672,7 +9525,7 @@
         </p:nvSpPr>
         <p:spPr>
           <a:xfrm>
-            <a:off x="6202539" y="2082232"/>
+            <a:off x="6179322" y="2064525"/>
             <a:ext cx="316866" cy="548831"/>
           </a:xfrm>
           <a:prstGeom prst="upDownArrow">
@@ -9942,7 +9795,7 @@
         </p:nvSpPr>
         <p:spPr>
           <a:xfrm>
-            <a:off x="4067174" y="356536"/>
+            <a:off x="4071506" y="356536"/>
             <a:ext cx="316866" cy="1448814"/>
           </a:xfrm>
           <a:prstGeom prst="upDownArrow">
@@ -10235,6 +10088,153 @@
             <a:r>
               <a:rPr lang="en-GB" sz="1000" dirty="0"/>
               <a:t>RAM/ROM</a:t>
+            </a:r>
+            <a:endParaRPr lang="en-US" sz="1000" dirty="0"/>
+          </a:p>
+        </p:txBody>
+      </p:sp>
+      <p:sp>
+        <p:nvSpPr>
+          <p:cNvPr id="234" name="Rectangle 233">
+            <a:extLst>
+              <a:ext uri="{FF2B5EF4-FFF2-40B4-BE49-F238E27FC236}">
+                <a16:creationId xmlns:a16="http://schemas.microsoft.com/office/drawing/2014/main" id="{54C9DDA2-0FA5-4A32-986A-D67CAB72D747}"/>
+              </a:ext>
+            </a:extLst>
+          </p:cNvPr>
+          <p:cNvSpPr/>
+          <p:nvPr/>
+        </p:nvSpPr>
+        <p:spPr>
+          <a:xfrm>
+            <a:off x="5903530" y="1798438"/>
+            <a:ext cx="827690" cy="280566"/>
+          </a:xfrm>
+          <a:prstGeom prst="rect">
+            <a:avLst/>
+          </a:prstGeom>
+          <a:ln w="3175"/>
+        </p:spPr>
+        <p:style>
+          <a:lnRef idx="2">
+            <a:schemeClr val="dk1"/>
+          </a:lnRef>
+          <a:fillRef idx="1">
+            <a:schemeClr val="lt1"/>
+          </a:fillRef>
+          <a:effectRef idx="0">
+            <a:schemeClr val="dk1"/>
+          </a:effectRef>
+          <a:fontRef idx="minor">
+            <a:schemeClr val="dk1"/>
+          </a:fontRef>
+        </p:style>
+        <p:txBody>
+          <a:bodyPr rtlCol="0" anchor="ctr"/>
+          <a:lstStyle/>
+          <a:p>
+            <a:pPr algn="ctr"/>
+            <a:r>
+              <a:rPr lang="en-GB" sz="1000" dirty="0"/>
+              <a:t>STASHL</a:t>
+            </a:r>
+            <a:endParaRPr lang="en-US" sz="1000" dirty="0"/>
+          </a:p>
+        </p:txBody>
+      </p:sp>
+      <p:sp>
+        <p:nvSpPr>
+          <p:cNvPr id="9" name="Rectangle 8">
+            <a:extLst>
+              <a:ext uri="{FF2B5EF4-FFF2-40B4-BE49-F238E27FC236}">
+                <a16:creationId xmlns:a16="http://schemas.microsoft.com/office/drawing/2014/main" id="{A2F9B9C3-65DC-445D-BB11-9BA115F9B13F}"/>
+              </a:ext>
+            </a:extLst>
+          </p:cNvPr>
+          <p:cNvSpPr/>
+          <p:nvPr/>
+        </p:nvSpPr>
+        <p:spPr>
+          <a:xfrm>
+            <a:off x="3811762" y="1798438"/>
+            <a:ext cx="827690" cy="283443"/>
+          </a:xfrm>
+          <a:prstGeom prst="rect">
+            <a:avLst/>
+          </a:prstGeom>
+          <a:ln w="3175"/>
+        </p:spPr>
+        <p:style>
+          <a:lnRef idx="2">
+            <a:schemeClr val="dk1"/>
+          </a:lnRef>
+          <a:fillRef idx="1">
+            <a:schemeClr val="lt1"/>
+          </a:fillRef>
+          <a:effectRef idx="0">
+            <a:schemeClr val="dk1"/>
+          </a:effectRef>
+          <a:fontRef idx="minor">
+            <a:schemeClr val="dk1"/>
+          </a:fontRef>
+        </p:style>
+        <p:txBody>
+          <a:bodyPr rtlCol="0" anchor="ctr"/>
+          <a:lstStyle/>
+          <a:p>
+            <a:pPr algn="ctr"/>
+            <a:r>
+              <a:rPr lang="en-GB" sz="1000" dirty="0"/>
+              <a:t>MBR</a:t>
+            </a:r>
+            <a:endParaRPr lang="en-US" sz="1000" dirty="0"/>
+          </a:p>
+        </p:txBody>
+      </p:sp>
+      <p:sp>
+        <p:nvSpPr>
+          <p:cNvPr id="6" name="Rectangle 5">
+            <a:extLst>
+              <a:ext uri="{FF2B5EF4-FFF2-40B4-BE49-F238E27FC236}">
+                <a16:creationId xmlns:a16="http://schemas.microsoft.com/office/drawing/2014/main" id="{512F4E7D-EB97-4933-B5BA-1C205DBA8F87}"/>
+              </a:ext>
+            </a:extLst>
+          </p:cNvPr>
+          <p:cNvSpPr/>
+          <p:nvPr/>
+        </p:nvSpPr>
+        <p:spPr>
+          <a:xfrm>
+            <a:off x="4857646" y="1798438"/>
+            <a:ext cx="827690" cy="280496"/>
+          </a:xfrm>
+          <a:prstGeom prst="rect">
+            <a:avLst/>
+          </a:prstGeom>
+          <a:ln w="3175"/>
+        </p:spPr>
+        <p:style>
+          <a:lnRef idx="2">
+            <a:schemeClr val="dk1"/>
+          </a:lnRef>
+          <a:fillRef idx="1">
+            <a:schemeClr val="lt1"/>
+          </a:fillRef>
+          <a:effectRef idx="0">
+            <a:schemeClr val="dk1"/>
+          </a:effectRef>
+          <a:fontRef idx="minor">
+            <a:schemeClr val="dk1"/>
+          </a:fontRef>
+        </p:style>
+        <p:txBody>
+          <a:bodyPr rtlCol="0" anchor="ctr"/>
+          <a:lstStyle/>
+          <a:p>
+            <a:pPr algn="ctr"/>
+            <a:r>
+              <a:rPr lang="en-GB" sz="1000" dirty="0"/>
+              <a:t>IR</a:t>
             </a:r>
             <a:endParaRPr lang="en-US" sz="1000" dirty="0"/>
           </a:p>

</xml_diff>